<commit_message>
Updates to instruction manual, including troubleshooting on ImageJ version. Introduce Contrast_area_quant_directory_v2.1.txt.
</commit_message>
<xml_diff>
--- a/PAM_analysis_pipeline/markdown/screenshots/screenshot_19.pptx
+++ b/PAM_analysis_pipeline/markdown/screenshots/screenshot_19.pptx
@@ -2,18 +2,18 @@
 <file path=ppt/presentation.xml><?xml version="1.0" encoding="utf-8"?>
 <p:presentation xmlns:a="http://schemas.openxmlformats.org/drawingml/2006/main" xmlns:r="http://schemas.openxmlformats.org/officeDocument/2006/relationships" xmlns:p="http://schemas.openxmlformats.org/presentationml/2006/main" saveSubsetFonts="1">
   <p:sldMasterIdLst>
-    <p:sldMasterId id="2147483648" r:id="rId1"/>
+    <p:sldMasterId id="2147483684" r:id="rId1"/>
   </p:sldMasterIdLst>
   <p:sldIdLst>
     <p:sldId id="256" r:id="rId2"/>
   </p:sldIdLst>
-  <p:sldSz cx="12192000" cy="6858000"/>
+  <p:sldSz cx="12192000" cy="3200400"/>
   <p:notesSz cx="6858000" cy="9144000"/>
   <p:defaultTextStyle>
     <a:defPPr>
-      <a:defRPr lang="de-DE"/>
+      <a:defRPr lang="en-US"/>
     </a:defPPr>
-    <a:lvl1pPr marL="0" algn="l" defTabSz="914400" rtl="0" eaLnBrk="1" latinLnBrk="0" hangingPunct="1">
+    <a:lvl1pPr marL="0" algn="l" defTabSz="457200" rtl="0" eaLnBrk="1" latinLnBrk="0" hangingPunct="1">
       <a:defRPr sz="1800" kern="1200">
         <a:solidFill>
           <a:schemeClr val="tx1"/>
@@ -23,7 +23,7 @@
         <a:cs typeface="+mn-cs"/>
       </a:defRPr>
     </a:lvl1pPr>
-    <a:lvl2pPr marL="457200" algn="l" defTabSz="914400" rtl="0" eaLnBrk="1" latinLnBrk="0" hangingPunct="1">
+    <a:lvl2pPr marL="457200" algn="l" defTabSz="457200" rtl="0" eaLnBrk="1" latinLnBrk="0" hangingPunct="1">
       <a:defRPr sz="1800" kern="1200">
         <a:solidFill>
           <a:schemeClr val="tx1"/>
@@ -33,7 +33,7 @@
         <a:cs typeface="+mn-cs"/>
       </a:defRPr>
     </a:lvl2pPr>
-    <a:lvl3pPr marL="914400" algn="l" defTabSz="914400" rtl="0" eaLnBrk="1" latinLnBrk="0" hangingPunct="1">
+    <a:lvl3pPr marL="914400" algn="l" defTabSz="457200" rtl="0" eaLnBrk="1" latinLnBrk="0" hangingPunct="1">
       <a:defRPr sz="1800" kern="1200">
         <a:solidFill>
           <a:schemeClr val="tx1"/>
@@ -43,7 +43,7 @@
         <a:cs typeface="+mn-cs"/>
       </a:defRPr>
     </a:lvl3pPr>
-    <a:lvl4pPr marL="1371600" algn="l" defTabSz="914400" rtl="0" eaLnBrk="1" latinLnBrk="0" hangingPunct="1">
+    <a:lvl4pPr marL="1371600" algn="l" defTabSz="457200" rtl="0" eaLnBrk="1" latinLnBrk="0" hangingPunct="1">
       <a:defRPr sz="1800" kern="1200">
         <a:solidFill>
           <a:schemeClr val="tx1"/>
@@ -53,7 +53,7 @@
         <a:cs typeface="+mn-cs"/>
       </a:defRPr>
     </a:lvl4pPr>
-    <a:lvl5pPr marL="1828800" algn="l" defTabSz="914400" rtl="0" eaLnBrk="1" latinLnBrk="0" hangingPunct="1">
+    <a:lvl5pPr marL="1828800" algn="l" defTabSz="457200" rtl="0" eaLnBrk="1" latinLnBrk="0" hangingPunct="1">
       <a:defRPr sz="1800" kern="1200">
         <a:solidFill>
           <a:schemeClr val="tx1"/>
@@ -63,7 +63,7 @@
         <a:cs typeface="+mn-cs"/>
       </a:defRPr>
     </a:lvl5pPr>
-    <a:lvl6pPr marL="2286000" algn="l" defTabSz="914400" rtl="0" eaLnBrk="1" latinLnBrk="0" hangingPunct="1">
+    <a:lvl6pPr marL="2286000" algn="l" defTabSz="457200" rtl="0" eaLnBrk="1" latinLnBrk="0" hangingPunct="1">
       <a:defRPr sz="1800" kern="1200">
         <a:solidFill>
           <a:schemeClr val="tx1"/>
@@ -73,7 +73,7 @@
         <a:cs typeface="+mn-cs"/>
       </a:defRPr>
     </a:lvl6pPr>
-    <a:lvl7pPr marL="2743200" algn="l" defTabSz="914400" rtl="0" eaLnBrk="1" latinLnBrk="0" hangingPunct="1">
+    <a:lvl7pPr marL="2743200" algn="l" defTabSz="457200" rtl="0" eaLnBrk="1" latinLnBrk="0" hangingPunct="1">
       <a:defRPr sz="1800" kern="1200">
         <a:solidFill>
           <a:schemeClr val="tx1"/>
@@ -83,7 +83,7 @@
         <a:cs typeface="+mn-cs"/>
       </a:defRPr>
     </a:lvl7pPr>
-    <a:lvl8pPr marL="3200400" algn="l" defTabSz="914400" rtl="0" eaLnBrk="1" latinLnBrk="0" hangingPunct="1">
+    <a:lvl8pPr marL="3200400" algn="l" defTabSz="457200" rtl="0" eaLnBrk="1" latinLnBrk="0" hangingPunct="1">
       <a:defRPr sz="1800" kern="1200">
         <a:solidFill>
           <a:schemeClr val="tx1"/>
@@ -93,7 +93,7 @@
         <a:cs typeface="+mn-cs"/>
       </a:defRPr>
     </a:lvl8pPr>
-    <a:lvl9pPr marL="3657600" algn="l" defTabSz="914400" rtl="0" eaLnBrk="1" latinLnBrk="0" hangingPunct="1">
+    <a:lvl9pPr marL="3657600" algn="l" defTabSz="457200" rtl="0" eaLnBrk="1" latinLnBrk="0" hangingPunct="1">
       <a:defRPr sz="1800" kern="1200">
         <a:solidFill>
           <a:schemeClr val="tx1"/>
@@ -141,15 +141,15 @@
         </p:nvSpPr>
         <p:spPr>
           <a:xfrm>
-            <a:off x="1524000" y="1122363"/>
-            <a:ext cx="9144000" cy="2387600"/>
+            <a:off x="1524000" y="523770"/>
+            <a:ext cx="9144000" cy="1114213"/>
           </a:xfrm>
         </p:spPr>
         <p:txBody>
           <a:bodyPr anchor="b"/>
           <a:lstStyle>
             <a:lvl1pPr algn="ctr">
-              <a:defRPr sz="6000"/>
+              <a:defRPr sz="2800"/>
             </a:lvl1pPr>
           </a:lstStyle>
           <a:p>
@@ -157,7 +157,7 @@
               <a:rPr lang="en-US" smtClean="0"/>
               <a:t>Click to edit Master title style</a:t>
             </a:r>
-            <a:endParaRPr lang="de-DE"/>
+            <a:endParaRPr lang="en-US" dirty="0"/>
           </a:p>
         </p:txBody>
       </p:sp>
@@ -173,8 +173,8 @@
         </p:nvSpPr>
         <p:spPr>
           <a:xfrm>
-            <a:off x="1524000" y="3602038"/>
-            <a:ext cx="9144000" cy="1655762"/>
+            <a:off x="1524000" y="1680951"/>
+            <a:ext cx="9144000" cy="772689"/>
           </a:xfrm>
         </p:spPr>
         <p:txBody>
@@ -182,39 +182,39 @@
           <a:lstStyle>
             <a:lvl1pPr marL="0" indent="0" algn="ctr">
               <a:buNone/>
-              <a:defRPr sz="2400"/>
+              <a:defRPr sz="1120"/>
             </a:lvl1pPr>
-            <a:lvl2pPr marL="457200" indent="0" algn="ctr">
-              <a:buNone/>
-              <a:defRPr sz="2000"/>
+            <a:lvl2pPr marL="213375" indent="0" algn="ctr">
+              <a:buNone/>
+              <a:defRPr sz="933"/>
             </a:lvl2pPr>
-            <a:lvl3pPr marL="914400" indent="0" algn="ctr">
-              <a:buNone/>
-              <a:defRPr sz="1800"/>
+            <a:lvl3pPr marL="426750" indent="0" algn="ctr">
+              <a:buNone/>
+              <a:defRPr sz="840"/>
             </a:lvl3pPr>
-            <a:lvl4pPr marL="1371600" indent="0" algn="ctr">
-              <a:buNone/>
-              <a:defRPr sz="1600"/>
+            <a:lvl4pPr marL="640126" indent="0" algn="ctr">
+              <a:buNone/>
+              <a:defRPr sz="747"/>
             </a:lvl4pPr>
-            <a:lvl5pPr marL="1828800" indent="0" algn="ctr">
-              <a:buNone/>
-              <a:defRPr sz="1600"/>
+            <a:lvl5pPr marL="853501" indent="0" algn="ctr">
+              <a:buNone/>
+              <a:defRPr sz="747"/>
             </a:lvl5pPr>
-            <a:lvl6pPr marL="2286000" indent="0" algn="ctr">
-              <a:buNone/>
-              <a:defRPr sz="1600"/>
+            <a:lvl6pPr marL="1066876" indent="0" algn="ctr">
+              <a:buNone/>
+              <a:defRPr sz="747"/>
             </a:lvl6pPr>
-            <a:lvl7pPr marL="2743200" indent="0" algn="ctr">
-              <a:buNone/>
-              <a:defRPr sz="1600"/>
+            <a:lvl7pPr marL="1280251" indent="0" algn="ctr">
+              <a:buNone/>
+              <a:defRPr sz="747"/>
             </a:lvl7pPr>
-            <a:lvl8pPr marL="3200400" indent="0" algn="ctr">
-              <a:buNone/>
-              <a:defRPr sz="1600"/>
+            <a:lvl8pPr marL="1493627" indent="0" algn="ctr">
+              <a:buNone/>
+              <a:defRPr sz="747"/>
             </a:lvl8pPr>
-            <a:lvl9pPr marL="3657600" indent="0" algn="ctr">
-              <a:buNone/>
-              <a:defRPr sz="1600"/>
+            <a:lvl9pPr marL="1707002" indent="0" algn="ctr">
+              <a:buNone/>
+              <a:defRPr sz="747"/>
             </a:lvl9pPr>
           </a:lstStyle>
           <a:p>
@@ -222,7 +222,7 @@
               <a:rPr lang="en-US" smtClean="0"/>
               <a:t>Click to edit Master subtitle style</a:t>
             </a:r>
-            <a:endParaRPr lang="de-DE"/>
+            <a:endParaRPr lang="en-US" dirty="0"/>
           </a:p>
         </p:txBody>
       </p:sp>
@@ -243,7 +243,7 @@
           <a:p>
             <a:fld id="{D2406D3D-8B47-4E9B-B975-8AEF09BE12BE}" type="datetimeFigureOut">
               <a:rPr lang="de-DE" smtClean="0"/>
-              <a:t>09.11.2023</a:t>
+              <a:t>25.11.2023</a:t>
             </a:fld>
             <a:endParaRPr lang="de-DE"/>
           </a:p>
@@ -294,7 +294,7 @@
     </p:spTree>
     <p:extLst>
       <p:ext uri="{BB962C8B-B14F-4D97-AF65-F5344CB8AC3E}">
-        <p14:creationId xmlns:p14="http://schemas.microsoft.com/office/powerpoint/2010/main" val="1861837001"/>
+        <p14:creationId xmlns:p14="http://schemas.microsoft.com/office/powerpoint/2010/main" val="669516866"/>
       </p:ext>
     </p:extLst>
   </p:cSld>
@@ -340,7 +340,7 @@
               <a:rPr lang="en-US" smtClean="0"/>
               <a:t>Click to edit Master title style</a:t>
             </a:r>
-            <a:endParaRPr lang="de-DE"/>
+            <a:endParaRPr lang="en-US" dirty="0"/>
           </a:p>
         </p:txBody>
       </p:sp>
@@ -392,7 +392,7 @@
               <a:rPr lang="en-US" smtClean="0"/>
               <a:t>Fifth level</a:t>
             </a:r>
-            <a:endParaRPr lang="de-DE"/>
+            <a:endParaRPr lang="en-US" dirty="0"/>
           </a:p>
         </p:txBody>
       </p:sp>
@@ -413,7 +413,7 @@
           <a:p>
             <a:fld id="{D2406D3D-8B47-4E9B-B975-8AEF09BE12BE}" type="datetimeFigureOut">
               <a:rPr lang="de-DE" smtClean="0"/>
-              <a:t>09.11.2023</a:t>
+              <a:t>25.11.2023</a:t>
             </a:fld>
             <a:endParaRPr lang="de-DE"/>
           </a:p>
@@ -464,7 +464,7 @@
     </p:spTree>
     <p:extLst>
       <p:ext uri="{BB962C8B-B14F-4D97-AF65-F5344CB8AC3E}">
-        <p14:creationId xmlns:p14="http://schemas.microsoft.com/office/powerpoint/2010/main" val="3462158393"/>
+        <p14:creationId xmlns:p14="http://schemas.microsoft.com/office/powerpoint/2010/main" val="335943870"/>
       </p:ext>
     </p:extLst>
   </p:cSld>
@@ -503,8 +503,8 @@
         </p:nvSpPr>
         <p:spPr>
           <a:xfrm>
-            <a:off x="8724900" y="365125"/>
-            <a:ext cx="2628900" cy="5811838"/>
+            <a:off x="8724900" y="170392"/>
+            <a:ext cx="2628900" cy="2712191"/>
           </a:xfrm>
         </p:spPr>
         <p:txBody>
@@ -515,7 +515,7 @@
               <a:rPr lang="en-US" smtClean="0"/>
               <a:t>Click to edit Master title style</a:t>
             </a:r>
-            <a:endParaRPr lang="de-DE"/>
+            <a:endParaRPr lang="en-US" dirty="0"/>
           </a:p>
         </p:txBody>
       </p:sp>
@@ -531,8 +531,8 @@
         </p:nvSpPr>
         <p:spPr>
           <a:xfrm>
-            <a:off x="838200" y="365125"/>
-            <a:ext cx="7734300" cy="5811838"/>
+            <a:off x="838200" y="170392"/>
+            <a:ext cx="7734300" cy="2712191"/>
           </a:xfrm>
         </p:spPr>
         <p:txBody>
@@ -572,7 +572,7 @@
               <a:rPr lang="en-US" smtClean="0"/>
               <a:t>Fifth level</a:t>
             </a:r>
-            <a:endParaRPr lang="de-DE"/>
+            <a:endParaRPr lang="en-US" dirty="0"/>
           </a:p>
         </p:txBody>
       </p:sp>
@@ -593,7 +593,7 @@
           <a:p>
             <a:fld id="{D2406D3D-8B47-4E9B-B975-8AEF09BE12BE}" type="datetimeFigureOut">
               <a:rPr lang="de-DE" smtClean="0"/>
-              <a:t>09.11.2023</a:t>
+              <a:t>25.11.2023</a:t>
             </a:fld>
             <a:endParaRPr lang="de-DE"/>
           </a:p>
@@ -644,7 +644,7 @@
     </p:spTree>
     <p:extLst>
       <p:ext uri="{BB962C8B-B14F-4D97-AF65-F5344CB8AC3E}">
-        <p14:creationId xmlns:p14="http://schemas.microsoft.com/office/powerpoint/2010/main" val="1417413061"/>
+        <p14:creationId xmlns:p14="http://schemas.microsoft.com/office/powerpoint/2010/main" val="1566667249"/>
       </p:ext>
     </p:extLst>
   </p:cSld>
@@ -690,7 +690,7 @@
               <a:rPr lang="en-US" smtClean="0"/>
               <a:t>Click to edit Master title style</a:t>
             </a:r>
-            <a:endParaRPr lang="de-DE"/>
+            <a:endParaRPr lang="en-US" dirty="0"/>
           </a:p>
         </p:txBody>
       </p:sp>
@@ -742,7 +742,7 @@
               <a:rPr lang="en-US" smtClean="0"/>
               <a:t>Fifth level</a:t>
             </a:r>
-            <a:endParaRPr lang="de-DE"/>
+            <a:endParaRPr lang="en-US" dirty="0"/>
           </a:p>
         </p:txBody>
       </p:sp>
@@ -763,7 +763,7 @@
           <a:p>
             <a:fld id="{D2406D3D-8B47-4E9B-B975-8AEF09BE12BE}" type="datetimeFigureOut">
               <a:rPr lang="de-DE" smtClean="0"/>
-              <a:t>09.11.2023</a:t>
+              <a:t>25.11.2023</a:t>
             </a:fld>
             <a:endParaRPr lang="de-DE"/>
           </a:p>
@@ -814,7 +814,7 @@
     </p:spTree>
     <p:extLst>
       <p:ext uri="{BB962C8B-B14F-4D97-AF65-F5344CB8AC3E}">
-        <p14:creationId xmlns:p14="http://schemas.microsoft.com/office/powerpoint/2010/main" val="3961266893"/>
+        <p14:creationId xmlns:p14="http://schemas.microsoft.com/office/powerpoint/2010/main" val="1152781504"/>
       </p:ext>
     </p:extLst>
   </p:cSld>
@@ -853,15 +853,15 @@
         </p:nvSpPr>
         <p:spPr>
           <a:xfrm>
-            <a:off x="831850" y="1709738"/>
-            <a:ext cx="10515600" cy="2852737"/>
+            <a:off x="831850" y="797878"/>
+            <a:ext cx="10515600" cy="1331277"/>
           </a:xfrm>
         </p:spPr>
         <p:txBody>
           <a:bodyPr anchor="b"/>
           <a:lstStyle>
             <a:lvl1pPr>
-              <a:defRPr sz="6000"/>
+              <a:defRPr sz="2800"/>
             </a:lvl1pPr>
           </a:lstStyle>
           <a:p>
@@ -869,7 +869,7 @@
               <a:rPr lang="en-US" smtClean="0"/>
               <a:t>Click to edit Master title style</a:t>
             </a:r>
-            <a:endParaRPr lang="de-DE"/>
+            <a:endParaRPr lang="en-US" dirty="0"/>
           </a:p>
         </p:txBody>
       </p:sp>
@@ -885,8 +885,8 @@
         </p:nvSpPr>
         <p:spPr>
           <a:xfrm>
-            <a:off x="831850" y="4589463"/>
-            <a:ext cx="10515600" cy="1500187"/>
+            <a:off x="831850" y="2141750"/>
+            <a:ext cx="10515600" cy="700087"/>
           </a:xfrm>
         </p:spPr>
         <p:txBody>
@@ -894,7 +894,7 @@
           <a:lstStyle>
             <a:lvl1pPr marL="0" indent="0">
               <a:buNone/>
-              <a:defRPr sz="2400">
+              <a:defRPr sz="1120">
                 <a:solidFill>
                   <a:schemeClr val="tx1">
                     <a:tint val="75000"/>
@@ -902,9 +902,9 @@
                 </a:solidFill>
               </a:defRPr>
             </a:lvl1pPr>
-            <a:lvl2pPr marL="457200" indent="0">
-              <a:buNone/>
-              <a:defRPr sz="2000">
+            <a:lvl2pPr marL="213375" indent="0">
+              <a:buNone/>
+              <a:defRPr sz="933">
                 <a:solidFill>
                   <a:schemeClr val="tx1">
                     <a:tint val="75000"/>
@@ -912,9 +912,9 @@
                 </a:solidFill>
               </a:defRPr>
             </a:lvl2pPr>
-            <a:lvl3pPr marL="914400" indent="0">
-              <a:buNone/>
-              <a:defRPr sz="1800">
+            <a:lvl3pPr marL="426750" indent="0">
+              <a:buNone/>
+              <a:defRPr sz="840">
                 <a:solidFill>
                   <a:schemeClr val="tx1">
                     <a:tint val="75000"/>
@@ -922,9 +922,9 @@
                 </a:solidFill>
               </a:defRPr>
             </a:lvl3pPr>
-            <a:lvl4pPr marL="1371600" indent="0">
-              <a:buNone/>
-              <a:defRPr sz="1600">
+            <a:lvl4pPr marL="640126" indent="0">
+              <a:buNone/>
+              <a:defRPr sz="747">
                 <a:solidFill>
                   <a:schemeClr val="tx1">
                     <a:tint val="75000"/>
@@ -932,9 +932,9 @@
                 </a:solidFill>
               </a:defRPr>
             </a:lvl4pPr>
-            <a:lvl5pPr marL="1828800" indent="0">
-              <a:buNone/>
-              <a:defRPr sz="1600">
+            <a:lvl5pPr marL="853501" indent="0">
+              <a:buNone/>
+              <a:defRPr sz="747">
                 <a:solidFill>
                   <a:schemeClr val="tx1">
                     <a:tint val="75000"/>
@@ -942,9 +942,9 @@
                 </a:solidFill>
               </a:defRPr>
             </a:lvl5pPr>
-            <a:lvl6pPr marL="2286000" indent="0">
-              <a:buNone/>
-              <a:defRPr sz="1600">
+            <a:lvl6pPr marL="1066876" indent="0">
+              <a:buNone/>
+              <a:defRPr sz="747">
                 <a:solidFill>
                   <a:schemeClr val="tx1">
                     <a:tint val="75000"/>
@@ -952,9 +952,9 @@
                 </a:solidFill>
               </a:defRPr>
             </a:lvl6pPr>
-            <a:lvl7pPr marL="2743200" indent="0">
-              <a:buNone/>
-              <a:defRPr sz="1600">
+            <a:lvl7pPr marL="1280251" indent="0">
+              <a:buNone/>
+              <a:defRPr sz="747">
                 <a:solidFill>
                   <a:schemeClr val="tx1">
                     <a:tint val="75000"/>
@@ -962,9 +962,9 @@
                 </a:solidFill>
               </a:defRPr>
             </a:lvl7pPr>
-            <a:lvl8pPr marL="3200400" indent="0">
-              <a:buNone/>
-              <a:defRPr sz="1600">
+            <a:lvl8pPr marL="1493627" indent="0">
+              <a:buNone/>
+              <a:defRPr sz="747">
                 <a:solidFill>
                   <a:schemeClr val="tx1">
                     <a:tint val="75000"/>
@@ -972,9 +972,9 @@
                 </a:solidFill>
               </a:defRPr>
             </a:lvl8pPr>
-            <a:lvl9pPr marL="3657600" indent="0">
-              <a:buNone/>
-              <a:defRPr sz="1600">
+            <a:lvl9pPr marL="1707002" indent="0">
+              <a:buNone/>
+              <a:defRPr sz="747">
                 <a:solidFill>
                   <a:schemeClr val="tx1">
                     <a:tint val="75000"/>
@@ -1009,7 +1009,7 @@
           <a:p>
             <a:fld id="{D2406D3D-8B47-4E9B-B975-8AEF09BE12BE}" type="datetimeFigureOut">
               <a:rPr lang="de-DE" smtClean="0"/>
-              <a:t>09.11.2023</a:t>
+              <a:t>25.11.2023</a:t>
             </a:fld>
             <a:endParaRPr lang="de-DE"/>
           </a:p>
@@ -1060,7 +1060,7 @@
     </p:spTree>
     <p:extLst>
       <p:ext uri="{BB962C8B-B14F-4D97-AF65-F5344CB8AC3E}">
-        <p14:creationId xmlns:p14="http://schemas.microsoft.com/office/powerpoint/2010/main" val="3735678422"/>
+        <p14:creationId xmlns:p14="http://schemas.microsoft.com/office/powerpoint/2010/main" val="1397264414"/>
       </p:ext>
     </p:extLst>
   </p:cSld>
@@ -1106,7 +1106,7 @@
               <a:rPr lang="en-US" smtClean="0"/>
               <a:t>Click to edit Master title style</a:t>
             </a:r>
-            <a:endParaRPr lang="de-DE"/>
+            <a:endParaRPr lang="en-US" dirty="0"/>
           </a:p>
         </p:txBody>
       </p:sp>
@@ -1122,8 +1122,8 @@
         </p:nvSpPr>
         <p:spPr>
           <a:xfrm>
-            <a:off x="838200" y="1825625"/>
-            <a:ext cx="5181600" cy="4351338"/>
+            <a:off x="838200" y="851959"/>
+            <a:ext cx="5181600" cy="2030624"/>
           </a:xfrm>
         </p:spPr>
         <p:txBody>
@@ -1163,7 +1163,7 @@
               <a:rPr lang="en-US" smtClean="0"/>
               <a:t>Fifth level</a:t>
             </a:r>
-            <a:endParaRPr lang="de-DE"/>
+            <a:endParaRPr lang="en-US" dirty="0"/>
           </a:p>
         </p:txBody>
       </p:sp>
@@ -1179,8 +1179,8 @@
         </p:nvSpPr>
         <p:spPr>
           <a:xfrm>
-            <a:off x="6172200" y="1825625"/>
-            <a:ext cx="5181600" cy="4351338"/>
+            <a:off x="6172200" y="851959"/>
+            <a:ext cx="5181600" cy="2030624"/>
           </a:xfrm>
         </p:spPr>
         <p:txBody>
@@ -1220,7 +1220,7 @@
               <a:rPr lang="en-US" smtClean="0"/>
               <a:t>Fifth level</a:t>
             </a:r>
-            <a:endParaRPr lang="de-DE"/>
+            <a:endParaRPr lang="en-US" dirty="0"/>
           </a:p>
         </p:txBody>
       </p:sp>
@@ -1241,7 +1241,7 @@
           <a:p>
             <a:fld id="{D2406D3D-8B47-4E9B-B975-8AEF09BE12BE}" type="datetimeFigureOut">
               <a:rPr lang="de-DE" smtClean="0"/>
-              <a:t>09.11.2023</a:t>
+              <a:t>25.11.2023</a:t>
             </a:fld>
             <a:endParaRPr lang="de-DE"/>
           </a:p>
@@ -1292,7 +1292,7 @@
     </p:spTree>
     <p:extLst>
       <p:ext uri="{BB962C8B-B14F-4D97-AF65-F5344CB8AC3E}">
-        <p14:creationId xmlns:p14="http://schemas.microsoft.com/office/powerpoint/2010/main" val="435180185"/>
+        <p14:creationId xmlns:p14="http://schemas.microsoft.com/office/powerpoint/2010/main" val="1252276154"/>
       </p:ext>
     </p:extLst>
   </p:cSld>
@@ -1331,8 +1331,8 @@
         </p:nvSpPr>
         <p:spPr>
           <a:xfrm>
-            <a:off x="839788" y="365125"/>
-            <a:ext cx="10515600" cy="1325563"/>
+            <a:off x="839788" y="170392"/>
+            <a:ext cx="10515600" cy="618596"/>
           </a:xfrm>
         </p:spPr>
         <p:txBody>
@@ -1343,7 +1343,7 @@
               <a:rPr lang="en-US" smtClean="0"/>
               <a:t>Click to edit Master title style</a:t>
             </a:r>
-            <a:endParaRPr lang="de-DE"/>
+            <a:endParaRPr lang="en-US" dirty="0"/>
           </a:p>
         </p:txBody>
       </p:sp>
@@ -1359,8 +1359,8 @@
         </p:nvSpPr>
         <p:spPr>
           <a:xfrm>
-            <a:off x="839788" y="1681163"/>
-            <a:ext cx="5157787" cy="823912"/>
+            <a:off x="839789" y="784543"/>
+            <a:ext cx="5157787" cy="384492"/>
           </a:xfrm>
         </p:spPr>
         <p:txBody>
@@ -1368,39 +1368,39 @@
           <a:lstStyle>
             <a:lvl1pPr marL="0" indent="0">
               <a:buNone/>
-              <a:defRPr sz="2400" b="1"/>
+              <a:defRPr sz="1120" b="1"/>
             </a:lvl1pPr>
-            <a:lvl2pPr marL="457200" indent="0">
-              <a:buNone/>
-              <a:defRPr sz="2000" b="1"/>
+            <a:lvl2pPr marL="213375" indent="0">
+              <a:buNone/>
+              <a:defRPr sz="933" b="1"/>
             </a:lvl2pPr>
-            <a:lvl3pPr marL="914400" indent="0">
-              <a:buNone/>
-              <a:defRPr sz="1800" b="1"/>
+            <a:lvl3pPr marL="426750" indent="0">
+              <a:buNone/>
+              <a:defRPr sz="840" b="1"/>
             </a:lvl3pPr>
-            <a:lvl4pPr marL="1371600" indent="0">
-              <a:buNone/>
-              <a:defRPr sz="1600" b="1"/>
+            <a:lvl4pPr marL="640126" indent="0">
+              <a:buNone/>
+              <a:defRPr sz="747" b="1"/>
             </a:lvl4pPr>
-            <a:lvl5pPr marL="1828800" indent="0">
-              <a:buNone/>
-              <a:defRPr sz="1600" b="1"/>
+            <a:lvl5pPr marL="853501" indent="0">
+              <a:buNone/>
+              <a:defRPr sz="747" b="1"/>
             </a:lvl5pPr>
-            <a:lvl6pPr marL="2286000" indent="0">
-              <a:buNone/>
-              <a:defRPr sz="1600" b="1"/>
+            <a:lvl6pPr marL="1066876" indent="0">
+              <a:buNone/>
+              <a:defRPr sz="747" b="1"/>
             </a:lvl6pPr>
-            <a:lvl7pPr marL="2743200" indent="0">
-              <a:buNone/>
-              <a:defRPr sz="1600" b="1"/>
+            <a:lvl7pPr marL="1280251" indent="0">
+              <a:buNone/>
+              <a:defRPr sz="747" b="1"/>
             </a:lvl7pPr>
-            <a:lvl8pPr marL="3200400" indent="0">
-              <a:buNone/>
-              <a:defRPr sz="1600" b="1"/>
+            <a:lvl8pPr marL="1493627" indent="0">
+              <a:buNone/>
+              <a:defRPr sz="747" b="1"/>
             </a:lvl8pPr>
-            <a:lvl9pPr marL="3657600" indent="0">
-              <a:buNone/>
-              <a:defRPr sz="1600" b="1"/>
+            <a:lvl9pPr marL="1707002" indent="0">
+              <a:buNone/>
+              <a:defRPr sz="747" b="1"/>
             </a:lvl9pPr>
           </a:lstStyle>
           <a:p>
@@ -1424,8 +1424,8 @@
         </p:nvSpPr>
         <p:spPr>
           <a:xfrm>
-            <a:off x="839788" y="2505075"/>
-            <a:ext cx="5157787" cy="3684588"/>
+            <a:off x="839789" y="1169035"/>
+            <a:ext cx="5157787" cy="1719474"/>
           </a:xfrm>
         </p:spPr>
         <p:txBody>
@@ -1465,7 +1465,7 @@
               <a:rPr lang="en-US" smtClean="0"/>
               <a:t>Fifth level</a:t>
             </a:r>
-            <a:endParaRPr lang="de-DE"/>
+            <a:endParaRPr lang="en-US" dirty="0"/>
           </a:p>
         </p:txBody>
       </p:sp>
@@ -1481,8 +1481,8 @@
         </p:nvSpPr>
         <p:spPr>
           <a:xfrm>
-            <a:off x="6172200" y="1681163"/>
-            <a:ext cx="5183188" cy="823912"/>
+            <a:off x="6172200" y="784543"/>
+            <a:ext cx="5183188" cy="384492"/>
           </a:xfrm>
         </p:spPr>
         <p:txBody>
@@ -1490,39 +1490,39 @@
           <a:lstStyle>
             <a:lvl1pPr marL="0" indent="0">
               <a:buNone/>
-              <a:defRPr sz="2400" b="1"/>
+              <a:defRPr sz="1120" b="1"/>
             </a:lvl1pPr>
-            <a:lvl2pPr marL="457200" indent="0">
-              <a:buNone/>
-              <a:defRPr sz="2000" b="1"/>
+            <a:lvl2pPr marL="213375" indent="0">
+              <a:buNone/>
+              <a:defRPr sz="933" b="1"/>
             </a:lvl2pPr>
-            <a:lvl3pPr marL="914400" indent="0">
-              <a:buNone/>
-              <a:defRPr sz="1800" b="1"/>
+            <a:lvl3pPr marL="426750" indent="0">
+              <a:buNone/>
+              <a:defRPr sz="840" b="1"/>
             </a:lvl3pPr>
-            <a:lvl4pPr marL="1371600" indent="0">
-              <a:buNone/>
-              <a:defRPr sz="1600" b="1"/>
+            <a:lvl4pPr marL="640126" indent="0">
+              <a:buNone/>
+              <a:defRPr sz="747" b="1"/>
             </a:lvl4pPr>
-            <a:lvl5pPr marL="1828800" indent="0">
-              <a:buNone/>
-              <a:defRPr sz="1600" b="1"/>
+            <a:lvl5pPr marL="853501" indent="0">
+              <a:buNone/>
+              <a:defRPr sz="747" b="1"/>
             </a:lvl5pPr>
-            <a:lvl6pPr marL="2286000" indent="0">
-              <a:buNone/>
-              <a:defRPr sz="1600" b="1"/>
+            <a:lvl6pPr marL="1066876" indent="0">
+              <a:buNone/>
+              <a:defRPr sz="747" b="1"/>
             </a:lvl6pPr>
-            <a:lvl7pPr marL="2743200" indent="0">
-              <a:buNone/>
-              <a:defRPr sz="1600" b="1"/>
+            <a:lvl7pPr marL="1280251" indent="0">
+              <a:buNone/>
+              <a:defRPr sz="747" b="1"/>
             </a:lvl7pPr>
-            <a:lvl8pPr marL="3200400" indent="0">
-              <a:buNone/>
-              <a:defRPr sz="1600" b="1"/>
+            <a:lvl8pPr marL="1493627" indent="0">
+              <a:buNone/>
+              <a:defRPr sz="747" b="1"/>
             </a:lvl8pPr>
-            <a:lvl9pPr marL="3657600" indent="0">
-              <a:buNone/>
-              <a:defRPr sz="1600" b="1"/>
+            <a:lvl9pPr marL="1707002" indent="0">
+              <a:buNone/>
+              <a:defRPr sz="747" b="1"/>
             </a:lvl9pPr>
           </a:lstStyle>
           <a:p>
@@ -1546,8 +1546,8 @@
         </p:nvSpPr>
         <p:spPr>
           <a:xfrm>
-            <a:off x="6172200" y="2505075"/>
-            <a:ext cx="5183188" cy="3684588"/>
+            <a:off x="6172200" y="1169035"/>
+            <a:ext cx="5183188" cy="1719474"/>
           </a:xfrm>
         </p:spPr>
         <p:txBody>
@@ -1587,7 +1587,7 @@
               <a:rPr lang="en-US" smtClean="0"/>
               <a:t>Fifth level</a:t>
             </a:r>
-            <a:endParaRPr lang="de-DE"/>
+            <a:endParaRPr lang="en-US" dirty="0"/>
           </a:p>
         </p:txBody>
       </p:sp>
@@ -1608,7 +1608,7 @@
           <a:p>
             <a:fld id="{D2406D3D-8B47-4E9B-B975-8AEF09BE12BE}" type="datetimeFigureOut">
               <a:rPr lang="de-DE" smtClean="0"/>
-              <a:t>09.11.2023</a:t>
+              <a:t>25.11.2023</a:t>
             </a:fld>
             <a:endParaRPr lang="de-DE"/>
           </a:p>
@@ -1659,7 +1659,7 @@
     </p:spTree>
     <p:extLst>
       <p:ext uri="{BB962C8B-B14F-4D97-AF65-F5344CB8AC3E}">
-        <p14:creationId xmlns:p14="http://schemas.microsoft.com/office/powerpoint/2010/main" val="15858796"/>
+        <p14:creationId xmlns:p14="http://schemas.microsoft.com/office/powerpoint/2010/main" val="380801619"/>
       </p:ext>
     </p:extLst>
   </p:cSld>
@@ -1705,7 +1705,7 @@
               <a:rPr lang="en-US" smtClean="0"/>
               <a:t>Click to edit Master title style</a:t>
             </a:r>
-            <a:endParaRPr lang="de-DE"/>
+            <a:endParaRPr lang="en-US" dirty="0"/>
           </a:p>
         </p:txBody>
       </p:sp>
@@ -1726,7 +1726,7 @@
           <a:p>
             <a:fld id="{D2406D3D-8B47-4E9B-B975-8AEF09BE12BE}" type="datetimeFigureOut">
               <a:rPr lang="de-DE" smtClean="0"/>
-              <a:t>09.11.2023</a:t>
+              <a:t>25.11.2023</a:t>
             </a:fld>
             <a:endParaRPr lang="de-DE"/>
           </a:p>
@@ -1777,7 +1777,7 @@
     </p:spTree>
     <p:extLst>
       <p:ext uri="{BB962C8B-B14F-4D97-AF65-F5344CB8AC3E}">
-        <p14:creationId xmlns:p14="http://schemas.microsoft.com/office/powerpoint/2010/main" val="1809523772"/>
+        <p14:creationId xmlns:p14="http://schemas.microsoft.com/office/powerpoint/2010/main" val="323400164"/>
       </p:ext>
     </p:extLst>
   </p:cSld>
@@ -1821,7 +1821,7 @@
           <a:p>
             <a:fld id="{D2406D3D-8B47-4E9B-B975-8AEF09BE12BE}" type="datetimeFigureOut">
               <a:rPr lang="de-DE" smtClean="0"/>
-              <a:t>09.11.2023</a:t>
+              <a:t>25.11.2023</a:t>
             </a:fld>
             <a:endParaRPr lang="de-DE"/>
           </a:p>
@@ -1872,7 +1872,7 @@
     </p:spTree>
     <p:extLst>
       <p:ext uri="{BB962C8B-B14F-4D97-AF65-F5344CB8AC3E}">
-        <p14:creationId xmlns:p14="http://schemas.microsoft.com/office/powerpoint/2010/main" val="1115954611"/>
+        <p14:creationId xmlns:p14="http://schemas.microsoft.com/office/powerpoint/2010/main" val="2440701784"/>
       </p:ext>
     </p:extLst>
   </p:cSld>
@@ -1911,15 +1911,15 @@
         </p:nvSpPr>
         <p:spPr>
           <a:xfrm>
-            <a:off x="839788" y="457200"/>
-            <a:ext cx="3932237" cy="1600200"/>
+            <a:off x="839789" y="213360"/>
+            <a:ext cx="3932237" cy="746760"/>
           </a:xfrm>
         </p:spPr>
         <p:txBody>
           <a:bodyPr anchor="b"/>
           <a:lstStyle>
             <a:lvl1pPr>
-              <a:defRPr sz="3200"/>
+              <a:defRPr sz="1493"/>
             </a:lvl1pPr>
           </a:lstStyle>
           <a:p>
@@ -1927,7 +1927,7 @@
               <a:rPr lang="en-US" smtClean="0"/>
               <a:t>Click to edit Master title style</a:t>
             </a:r>
-            <a:endParaRPr lang="de-DE"/>
+            <a:endParaRPr lang="en-US" dirty="0"/>
           </a:p>
         </p:txBody>
       </p:sp>
@@ -1943,39 +1943,39 @@
         </p:nvSpPr>
         <p:spPr>
           <a:xfrm>
-            <a:off x="5183188" y="987425"/>
-            <a:ext cx="6172200" cy="4873625"/>
+            <a:off x="5183188" y="460799"/>
+            <a:ext cx="6172200" cy="2274358"/>
           </a:xfrm>
         </p:spPr>
         <p:txBody>
           <a:bodyPr/>
           <a:lstStyle>
             <a:lvl1pPr>
-              <a:defRPr sz="3200"/>
+              <a:defRPr sz="1493"/>
             </a:lvl1pPr>
             <a:lvl2pPr>
-              <a:defRPr sz="2800"/>
+              <a:defRPr sz="1307"/>
             </a:lvl2pPr>
             <a:lvl3pPr>
-              <a:defRPr sz="2400"/>
+              <a:defRPr sz="1120"/>
             </a:lvl3pPr>
             <a:lvl4pPr>
-              <a:defRPr sz="2000"/>
+              <a:defRPr sz="933"/>
             </a:lvl4pPr>
             <a:lvl5pPr>
-              <a:defRPr sz="2000"/>
+              <a:defRPr sz="933"/>
             </a:lvl5pPr>
             <a:lvl6pPr>
-              <a:defRPr sz="2000"/>
+              <a:defRPr sz="933"/>
             </a:lvl6pPr>
             <a:lvl7pPr>
-              <a:defRPr sz="2000"/>
+              <a:defRPr sz="933"/>
             </a:lvl7pPr>
             <a:lvl8pPr>
-              <a:defRPr sz="2000"/>
+              <a:defRPr sz="933"/>
             </a:lvl8pPr>
             <a:lvl9pPr>
-              <a:defRPr sz="2000"/>
+              <a:defRPr sz="933"/>
             </a:lvl9pPr>
           </a:lstStyle>
           <a:p>
@@ -2012,7 +2012,7 @@
               <a:rPr lang="en-US" smtClean="0"/>
               <a:t>Fifth level</a:t>
             </a:r>
-            <a:endParaRPr lang="de-DE"/>
+            <a:endParaRPr lang="en-US" dirty="0"/>
           </a:p>
         </p:txBody>
       </p:sp>
@@ -2028,8 +2028,8 @@
         </p:nvSpPr>
         <p:spPr>
           <a:xfrm>
-            <a:off x="839788" y="2057400"/>
-            <a:ext cx="3932237" cy="3811588"/>
+            <a:off x="839789" y="960120"/>
+            <a:ext cx="3932237" cy="1778741"/>
           </a:xfrm>
         </p:spPr>
         <p:txBody>
@@ -2037,39 +2037,39 @@
           <a:lstStyle>
             <a:lvl1pPr marL="0" indent="0">
               <a:buNone/>
-              <a:defRPr sz="1600"/>
+              <a:defRPr sz="747"/>
             </a:lvl1pPr>
-            <a:lvl2pPr marL="457200" indent="0">
-              <a:buNone/>
-              <a:defRPr sz="1400"/>
+            <a:lvl2pPr marL="213375" indent="0">
+              <a:buNone/>
+              <a:defRPr sz="653"/>
             </a:lvl2pPr>
-            <a:lvl3pPr marL="914400" indent="0">
-              <a:buNone/>
-              <a:defRPr sz="1200"/>
+            <a:lvl3pPr marL="426750" indent="0">
+              <a:buNone/>
+              <a:defRPr sz="560"/>
             </a:lvl3pPr>
-            <a:lvl4pPr marL="1371600" indent="0">
-              <a:buNone/>
-              <a:defRPr sz="1000"/>
+            <a:lvl4pPr marL="640126" indent="0">
+              <a:buNone/>
+              <a:defRPr sz="467"/>
             </a:lvl4pPr>
-            <a:lvl5pPr marL="1828800" indent="0">
-              <a:buNone/>
-              <a:defRPr sz="1000"/>
+            <a:lvl5pPr marL="853501" indent="0">
+              <a:buNone/>
+              <a:defRPr sz="467"/>
             </a:lvl5pPr>
-            <a:lvl6pPr marL="2286000" indent="0">
-              <a:buNone/>
-              <a:defRPr sz="1000"/>
+            <a:lvl6pPr marL="1066876" indent="0">
+              <a:buNone/>
+              <a:defRPr sz="467"/>
             </a:lvl6pPr>
-            <a:lvl7pPr marL="2743200" indent="0">
-              <a:buNone/>
-              <a:defRPr sz="1000"/>
+            <a:lvl7pPr marL="1280251" indent="0">
+              <a:buNone/>
+              <a:defRPr sz="467"/>
             </a:lvl7pPr>
-            <a:lvl8pPr marL="3200400" indent="0">
-              <a:buNone/>
-              <a:defRPr sz="1000"/>
+            <a:lvl8pPr marL="1493627" indent="0">
+              <a:buNone/>
+              <a:defRPr sz="467"/>
             </a:lvl8pPr>
-            <a:lvl9pPr marL="3657600" indent="0">
-              <a:buNone/>
-              <a:defRPr sz="1000"/>
+            <a:lvl9pPr marL="1707002" indent="0">
+              <a:buNone/>
+              <a:defRPr sz="467"/>
             </a:lvl9pPr>
           </a:lstStyle>
           <a:p>
@@ -2098,7 +2098,7 @@
           <a:p>
             <a:fld id="{D2406D3D-8B47-4E9B-B975-8AEF09BE12BE}" type="datetimeFigureOut">
               <a:rPr lang="de-DE" smtClean="0"/>
-              <a:t>09.11.2023</a:t>
+              <a:t>25.11.2023</a:t>
             </a:fld>
             <a:endParaRPr lang="de-DE"/>
           </a:p>
@@ -2149,7 +2149,7 @@
     </p:spTree>
     <p:extLst>
       <p:ext uri="{BB962C8B-B14F-4D97-AF65-F5344CB8AC3E}">
-        <p14:creationId xmlns:p14="http://schemas.microsoft.com/office/powerpoint/2010/main" val="3052089581"/>
+        <p14:creationId xmlns:p14="http://schemas.microsoft.com/office/powerpoint/2010/main" val="3852112378"/>
       </p:ext>
     </p:extLst>
   </p:cSld>
@@ -2188,15 +2188,15 @@
         </p:nvSpPr>
         <p:spPr>
           <a:xfrm>
-            <a:off x="839788" y="457200"/>
-            <a:ext cx="3932237" cy="1600200"/>
+            <a:off x="839789" y="213360"/>
+            <a:ext cx="3932237" cy="746760"/>
           </a:xfrm>
         </p:spPr>
         <p:txBody>
           <a:bodyPr anchor="b"/>
           <a:lstStyle>
             <a:lvl1pPr>
-              <a:defRPr sz="3200"/>
+              <a:defRPr sz="1493"/>
             </a:lvl1pPr>
           </a:lstStyle>
           <a:p>
@@ -2204,7 +2204,7 @@
               <a:rPr lang="en-US" smtClean="0"/>
               <a:t>Click to edit Master title style</a:t>
             </a:r>
-            <a:endParaRPr lang="de-DE"/>
+            <a:endParaRPr lang="en-US" dirty="0"/>
           </a:p>
         </p:txBody>
       </p:sp>
@@ -2212,7 +2212,7 @@
         <p:nvSpPr>
           <p:cNvPr id="3" name="Picture Placeholder 2"/>
           <p:cNvSpPr>
-            <a:spLocks noGrp="1"/>
+            <a:spLocks noGrp="1" noChangeAspect="1"/>
           </p:cNvSpPr>
           <p:nvPr>
             <p:ph type="pic" idx="1"/>
@@ -2220,52 +2220,56 @@
         </p:nvSpPr>
         <p:spPr>
           <a:xfrm>
-            <a:off x="5183188" y="987425"/>
-            <a:ext cx="6172200" cy="4873625"/>
+            <a:off x="5183188" y="460799"/>
+            <a:ext cx="6172200" cy="2274358"/>
           </a:xfrm>
         </p:spPr>
         <p:txBody>
-          <a:bodyPr/>
+          <a:bodyPr anchor="t"/>
           <a:lstStyle>
             <a:lvl1pPr marL="0" indent="0">
               <a:buNone/>
-              <a:defRPr sz="3200"/>
+              <a:defRPr sz="1493"/>
             </a:lvl1pPr>
-            <a:lvl2pPr marL="457200" indent="0">
-              <a:buNone/>
-              <a:defRPr sz="2800"/>
+            <a:lvl2pPr marL="213375" indent="0">
+              <a:buNone/>
+              <a:defRPr sz="1307"/>
             </a:lvl2pPr>
-            <a:lvl3pPr marL="914400" indent="0">
-              <a:buNone/>
-              <a:defRPr sz="2400"/>
+            <a:lvl3pPr marL="426750" indent="0">
+              <a:buNone/>
+              <a:defRPr sz="1120"/>
             </a:lvl3pPr>
-            <a:lvl4pPr marL="1371600" indent="0">
-              <a:buNone/>
-              <a:defRPr sz="2000"/>
+            <a:lvl4pPr marL="640126" indent="0">
+              <a:buNone/>
+              <a:defRPr sz="933"/>
             </a:lvl4pPr>
-            <a:lvl5pPr marL="1828800" indent="0">
-              <a:buNone/>
-              <a:defRPr sz="2000"/>
+            <a:lvl5pPr marL="853501" indent="0">
+              <a:buNone/>
+              <a:defRPr sz="933"/>
             </a:lvl5pPr>
-            <a:lvl6pPr marL="2286000" indent="0">
-              <a:buNone/>
-              <a:defRPr sz="2000"/>
+            <a:lvl6pPr marL="1066876" indent="0">
+              <a:buNone/>
+              <a:defRPr sz="933"/>
             </a:lvl6pPr>
-            <a:lvl7pPr marL="2743200" indent="0">
-              <a:buNone/>
-              <a:defRPr sz="2000"/>
+            <a:lvl7pPr marL="1280251" indent="0">
+              <a:buNone/>
+              <a:defRPr sz="933"/>
             </a:lvl7pPr>
-            <a:lvl8pPr marL="3200400" indent="0">
-              <a:buNone/>
-              <a:defRPr sz="2000"/>
+            <a:lvl8pPr marL="1493627" indent="0">
+              <a:buNone/>
+              <a:defRPr sz="933"/>
             </a:lvl8pPr>
-            <a:lvl9pPr marL="3657600" indent="0">
-              <a:buNone/>
-              <a:defRPr sz="2000"/>
+            <a:lvl9pPr marL="1707002" indent="0">
+              <a:buNone/>
+              <a:defRPr sz="933"/>
             </a:lvl9pPr>
           </a:lstStyle>
           <a:p>
-            <a:endParaRPr lang="de-DE"/>
+            <a:r>
+              <a:rPr lang="en-US" smtClean="0"/>
+              <a:t>Click icon to add picture</a:t>
+            </a:r>
+            <a:endParaRPr lang="en-US" dirty="0"/>
           </a:p>
         </p:txBody>
       </p:sp>
@@ -2281,8 +2285,8 @@
         </p:nvSpPr>
         <p:spPr>
           <a:xfrm>
-            <a:off x="839788" y="2057400"/>
-            <a:ext cx="3932237" cy="3811588"/>
+            <a:off x="839789" y="960120"/>
+            <a:ext cx="3932237" cy="1778741"/>
           </a:xfrm>
         </p:spPr>
         <p:txBody>
@@ -2290,39 +2294,39 @@
           <a:lstStyle>
             <a:lvl1pPr marL="0" indent="0">
               <a:buNone/>
-              <a:defRPr sz="1600"/>
+              <a:defRPr sz="747"/>
             </a:lvl1pPr>
-            <a:lvl2pPr marL="457200" indent="0">
-              <a:buNone/>
-              <a:defRPr sz="1400"/>
+            <a:lvl2pPr marL="213375" indent="0">
+              <a:buNone/>
+              <a:defRPr sz="653"/>
             </a:lvl2pPr>
-            <a:lvl3pPr marL="914400" indent="0">
-              <a:buNone/>
-              <a:defRPr sz="1200"/>
+            <a:lvl3pPr marL="426750" indent="0">
+              <a:buNone/>
+              <a:defRPr sz="560"/>
             </a:lvl3pPr>
-            <a:lvl4pPr marL="1371600" indent="0">
-              <a:buNone/>
-              <a:defRPr sz="1000"/>
+            <a:lvl4pPr marL="640126" indent="0">
+              <a:buNone/>
+              <a:defRPr sz="467"/>
             </a:lvl4pPr>
-            <a:lvl5pPr marL="1828800" indent="0">
-              <a:buNone/>
-              <a:defRPr sz="1000"/>
+            <a:lvl5pPr marL="853501" indent="0">
+              <a:buNone/>
+              <a:defRPr sz="467"/>
             </a:lvl5pPr>
-            <a:lvl6pPr marL="2286000" indent="0">
-              <a:buNone/>
-              <a:defRPr sz="1000"/>
+            <a:lvl6pPr marL="1066876" indent="0">
+              <a:buNone/>
+              <a:defRPr sz="467"/>
             </a:lvl6pPr>
-            <a:lvl7pPr marL="2743200" indent="0">
-              <a:buNone/>
-              <a:defRPr sz="1000"/>
+            <a:lvl7pPr marL="1280251" indent="0">
+              <a:buNone/>
+              <a:defRPr sz="467"/>
             </a:lvl7pPr>
-            <a:lvl8pPr marL="3200400" indent="0">
-              <a:buNone/>
-              <a:defRPr sz="1000"/>
+            <a:lvl8pPr marL="1493627" indent="0">
+              <a:buNone/>
+              <a:defRPr sz="467"/>
             </a:lvl8pPr>
-            <a:lvl9pPr marL="3657600" indent="0">
-              <a:buNone/>
-              <a:defRPr sz="1000"/>
+            <a:lvl9pPr marL="1707002" indent="0">
+              <a:buNone/>
+              <a:defRPr sz="467"/>
             </a:lvl9pPr>
           </a:lstStyle>
           <a:p>
@@ -2351,7 +2355,7 @@
           <a:p>
             <a:fld id="{D2406D3D-8B47-4E9B-B975-8AEF09BE12BE}" type="datetimeFigureOut">
               <a:rPr lang="de-DE" smtClean="0"/>
-              <a:t>09.11.2023</a:t>
+              <a:t>25.11.2023</a:t>
             </a:fld>
             <a:endParaRPr lang="de-DE"/>
           </a:p>
@@ -2402,7 +2406,7 @@
     </p:spTree>
     <p:extLst>
       <p:ext uri="{BB962C8B-B14F-4D97-AF65-F5344CB8AC3E}">
-        <p14:creationId xmlns:p14="http://schemas.microsoft.com/office/powerpoint/2010/main" val="247163834"/>
+        <p14:creationId xmlns:p14="http://schemas.microsoft.com/office/powerpoint/2010/main" val="3322820147"/>
       </p:ext>
     </p:extLst>
   </p:cSld>
@@ -2446,8 +2450,8 @@
         </p:nvSpPr>
         <p:spPr>
           <a:xfrm>
-            <a:off x="838200" y="365125"/>
-            <a:ext cx="10515600" cy="1325563"/>
+            <a:off x="838200" y="170392"/>
+            <a:ext cx="10515600" cy="618596"/>
           </a:xfrm>
           <a:prstGeom prst="rect">
             <a:avLst/>
@@ -2463,7 +2467,7 @@
               <a:rPr lang="en-US" smtClean="0"/>
               <a:t>Click to edit Master title style</a:t>
             </a:r>
-            <a:endParaRPr lang="de-DE"/>
+            <a:endParaRPr lang="en-US" dirty="0"/>
           </a:p>
         </p:txBody>
       </p:sp>
@@ -2479,8 +2483,8 @@
         </p:nvSpPr>
         <p:spPr>
           <a:xfrm>
-            <a:off x="838200" y="1825625"/>
-            <a:ext cx="10515600" cy="4351338"/>
+            <a:off x="838200" y="851959"/>
+            <a:ext cx="10515600" cy="2030624"/>
           </a:xfrm>
           <a:prstGeom prst="rect">
             <a:avLst/>
@@ -2525,7 +2529,7 @@
               <a:rPr lang="en-US" smtClean="0"/>
               <a:t>Fifth level</a:t>
             </a:r>
-            <a:endParaRPr lang="de-DE"/>
+            <a:endParaRPr lang="en-US" dirty="0"/>
           </a:p>
         </p:txBody>
       </p:sp>
@@ -2541,8 +2545,8 @@
         </p:nvSpPr>
         <p:spPr>
           <a:xfrm>
-            <a:off x="838200" y="6356350"/>
-            <a:ext cx="2743200" cy="365125"/>
+            <a:off x="838200" y="2966297"/>
+            <a:ext cx="2743200" cy="170392"/>
           </a:xfrm>
           <a:prstGeom prst="rect">
             <a:avLst/>
@@ -2552,7 +2556,7 @@
           <a:bodyPr vert="horz" lIns="91440" tIns="45720" rIns="91440" bIns="45720" rtlCol="0" anchor="ctr"/>
           <a:lstStyle>
             <a:lvl1pPr algn="l">
-              <a:defRPr sz="1200">
+              <a:defRPr sz="560">
                 <a:solidFill>
                   <a:schemeClr val="tx1">
                     <a:tint val="75000"/>
@@ -2564,7 +2568,7 @@
           <a:p>
             <a:fld id="{D2406D3D-8B47-4E9B-B975-8AEF09BE12BE}" type="datetimeFigureOut">
               <a:rPr lang="de-DE" smtClean="0"/>
-              <a:t>09.11.2023</a:t>
+              <a:t>25.11.2023</a:t>
             </a:fld>
             <a:endParaRPr lang="de-DE"/>
           </a:p>
@@ -2582,8 +2586,8 @@
         </p:nvSpPr>
         <p:spPr>
           <a:xfrm>
-            <a:off x="4038600" y="6356350"/>
-            <a:ext cx="4114800" cy="365125"/>
+            <a:off x="4038600" y="2966297"/>
+            <a:ext cx="4114800" cy="170392"/>
           </a:xfrm>
           <a:prstGeom prst="rect">
             <a:avLst/>
@@ -2593,7 +2597,7 @@
           <a:bodyPr vert="horz" lIns="91440" tIns="45720" rIns="91440" bIns="45720" rtlCol="0" anchor="ctr"/>
           <a:lstStyle>
             <a:lvl1pPr algn="ctr">
-              <a:defRPr sz="1200">
+              <a:defRPr sz="560">
                 <a:solidFill>
                   <a:schemeClr val="tx1">
                     <a:tint val="75000"/>
@@ -2619,8 +2623,8 @@
         </p:nvSpPr>
         <p:spPr>
           <a:xfrm>
-            <a:off x="8610600" y="6356350"/>
-            <a:ext cx="2743200" cy="365125"/>
+            <a:off x="8610600" y="2966297"/>
+            <a:ext cx="2743200" cy="170392"/>
           </a:xfrm>
           <a:prstGeom prst="rect">
             <a:avLst/>
@@ -2630,7 +2634,7 @@
           <a:bodyPr vert="horz" lIns="91440" tIns="45720" rIns="91440" bIns="45720" rtlCol="0" anchor="ctr"/>
           <a:lstStyle>
             <a:lvl1pPr algn="r">
-              <a:defRPr sz="1200">
+              <a:defRPr sz="560">
                 <a:solidFill>
                   <a:schemeClr val="tx1">
                     <a:tint val="75000"/>
@@ -2651,27 +2655,27 @@
     </p:spTree>
     <p:extLst>
       <p:ext uri="{BB962C8B-B14F-4D97-AF65-F5344CB8AC3E}">
-        <p14:creationId xmlns:p14="http://schemas.microsoft.com/office/powerpoint/2010/main" val="2636256354"/>
+        <p14:creationId xmlns:p14="http://schemas.microsoft.com/office/powerpoint/2010/main" val="554969757"/>
       </p:ext>
     </p:extLst>
   </p:cSld>
   <p:clrMap bg1="lt1" tx1="dk1" bg2="lt2" tx2="dk2" accent1="accent1" accent2="accent2" accent3="accent3" accent4="accent4" accent5="accent5" accent6="accent6" hlink="hlink" folHlink="folHlink"/>
   <p:sldLayoutIdLst>
-    <p:sldLayoutId id="2147483649" r:id="rId1"/>
-    <p:sldLayoutId id="2147483650" r:id="rId2"/>
-    <p:sldLayoutId id="2147483651" r:id="rId3"/>
-    <p:sldLayoutId id="2147483652" r:id="rId4"/>
-    <p:sldLayoutId id="2147483653" r:id="rId5"/>
-    <p:sldLayoutId id="2147483654" r:id="rId6"/>
-    <p:sldLayoutId id="2147483655" r:id="rId7"/>
-    <p:sldLayoutId id="2147483656" r:id="rId8"/>
-    <p:sldLayoutId id="2147483657" r:id="rId9"/>
-    <p:sldLayoutId id="2147483658" r:id="rId10"/>
-    <p:sldLayoutId id="2147483659" r:id="rId11"/>
+    <p:sldLayoutId id="2147483685" r:id="rId1"/>
+    <p:sldLayoutId id="2147483686" r:id="rId2"/>
+    <p:sldLayoutId id="2147483687" r:id="rId3"/>
+    <p:sldLayoutId id="2147483688" r:id="rId4"/>
+    <p:sldLayoutId id="2147483689" r:id="rId5"/>
+    <p:sldLayoutId id="2147483690" r:id="rId6"/>
+    <p:sldLayoutId id="2147483691" r:id="rId7"/>
+    <p:sldLayoutId id="2147483692" r:id="rId8"/>
+    <p:sldLayoutId id="2147483693" r:id="rId9"/>
+    <p:sldLayoutId id="2147483694" r:id="rId10"/>
+    <p:sldLayoutId id="2147483695" r:id="rId11"/>
   </p:sldLayoutIdLst>
   <p:txStyles>
     <p:titleStyle>
-      <a:lvl1pPr algn="l" defTabSz="914400" rtl="0" eaLnBrk="1" latinLnBrk="0" hangingPunct="1">
+      <a:lvl1pPr algn="l" defTabSz="426750" rtl="0" eaLnBrk="1" latinLnBrk="0" hangingPunct="1">
         <a:lnSpc>
           <a:spcPct val="90000"/>
         </a:lnSpc>
@@ -2679,7 +2683,7 @@
           <a:spcPct val="0"/>
         </a:spcBef>
         <a:buNone/>
-        <a:defRPr sz="4400" kern="1200">
+        <a:defRPr sz="2053" kern="1200">
           <a:solidFill>
             <a:schemeClr val="tx1"/>
           </a:solidFill>
@@ -2690,16 +2694,16 @@
       </a:lvl1pPr>
     </p:titleStyle>
     <p:bodyStyle>
-      <a:lvl1pPr marL="228600" indent="-228600" algn="l" defTabSz="914400" rtl="0" eaLnBrk="1" latinLnBrk="0" hangingPunct="1">
+      <a:lvl1pPr marL="106688" indent="-106688" algn="l" defTabSz="426750" rtl="0" eaLnBrk="1" latinLnBrk="0" hangingPunct="1">
         <a:lnSpc>
           <a:spcPct val="90000"/>
         </a:lnSpc>
         <a:spcBef>
-          <a:spcPts val="1000"/>
+          <a:spcPts val="467"/>
         </a:spcBef>
         <a:buFont typeface="Arial" panose="020B0604020202020204" pitchFamily="34" charset="0"/>
         <a:buChar char="•"/>
-        <a:defRPr sz="2800" kern="1200">
+        <a:defRPr sz="1307" kern="1200">
           <a:solidFill>
             <a:schemeClr val="tx1"/>
           </a:solidFill>
@@ -2708,16 +2712,16 @@
           <a:cs typeface="+mn-cs"/>
         </a:defRPr>
       </a:lvl1pPr>
-      <a:lvl2pPr marL="685800" indent="-228600" algn="l" defTabSz="914400" rtl="0" eaLnBrk="1" latinLnBrk="0" hangingPunct="1">
+      <a:lvl2pPr marL="320063" indent="-106688" algn="l" defTabSz="426750" rtl="0" eaLnBrk="1" latinLnBrk="0" hangingPunct="1">
         <a:lnSpc>
           <a:spcPct val="90000"/>
         </a:lnSpc>
         <a:spcBef>
-          <a:spcPts val="500"/>
+          <a:spcPts val="233"/>
         </a:spcBef>
         <a:buFont typeface="Arial" panose="020B0604020202020204" pitchFamily="34" charset="0"/>
         <a:buChar char="•"/>
-        <a:defRPr sz="2400" kern="1200">
+        <a:defRPr sz="1120" kern="1200">
           <a:solidFill>
             <a:schemeClr val="tx1"/>
           </a:solidFill>
@@ -2726,16 +2730,16 @@
           <a:cs typeface="+mn-cs"/>
         </a:defRPr>
       </a:lvl2pPr>
-      <a:lvl3pPr marL="1143000" indent="-228600" algn="l" defTabSz="914400" rtl="0" eaLnBrk="1" latinLnBrk="0" hangingPunct="1">
+      <a:lvl3pPr marL="533438" indent="-106688" algn="l" defTabSz="426750" rtl="0" eaLnBrk="1" latinLnBrk="0" hangingPunct="1">
         <a:lnSpc>
           <a:spcPct val="90000"/>
         </a:lnSpc>
         <a:spcBef>
-          <a:spcPts val="500"/>
+          <a:spcPts val="233"/>
         </a:spcBef>
         <a:buFont typeface="Arial" panose="020B0604020202020204" pitchFamily="34" charset="0"/>
         <a:buChar char="•"/>
-        <a:defRPr sz="2000" kern="1200">
+        <a:defRPr sz="933" kern="1200">
           <a:solidFill>
             <a:schemeClr val="tx1"/>
           </a:solidFill>
@@ -2744,16 +2748,16 @@
           <a:cs typeface="+mn-cs"/>
         </a:defRPr>
       </a:lvl3pPr>
-      <a:lvl4pPr marL="1600200" indent="-228600" algn="l" defTabSz="914400" rtl="0" eaLnBrk="1" latinLnBrk="0" hangingPunct="1">
+      <a:lvl4pPr marL="746813" indent="-106688" algn="l" defTabSz="426750" rtl="0" eaLnBrk="1" latinLnBrk="0" hangingPunct="1">
         <a:lnSpc>
           <a:spcPct val="90000"/>
         </a:lnSpc>
         <a:spcBef>
-          <a:spcPts val="500"/>
+          <a:spcPts val="233"/>
         </a:spcBef>
         <a:buFont typeface="Arial" panose="020B0604020202020204" pitchFamily="34" charset="0"/>
         <a:buChar char="•"/>
-        <a:defRPr sz="1800" kern="1200">
+        <a:defRPr sz="840" kern="1200">
           <a:solidFill>
             <a:schemeClr val="tx1"/>
           </a:solidFill>
@@ -2762,16 +2766,16 @@
           <a:cs typeface="+mn-cs"/>
         </a:defRPr>
       </a:lvl4pPr>
-      <a:lvl5pPr marL="2057400" indent="-228600" algn="l" defTabSz="914400" rtl="0" eaLnBrk="1" latinLnBrk="0" hangingPunct="1">
+      <a:lvl5pPr marL="960189" indent="-106688" algn="l" defTabSz="426750" rtl="0" eaLnBrk="1" latinLnBrk="0" hangingPunct="1">
         <a:lnSpc>
           <a:spcPct val="90000"/>
         </a:lnSpc>
         <a:spcBef>
-          <a:spcPts val="500"/>
+          <a:spcPts val="233"/>
         </a:spcBef>
         <a:buFont typeface="Arial" panose="020B0604020202020204" pitchFamily="34" charset="0"/>
         <a:buChar char="•"/>
-        <a:defRPr sz="1800" kern="1200">
+        <a:defRPr sz="840" kern="1200">
           <a:solidFill>
             <a:schemeClr val="tx1"/>
           </a:solidFill>
@@ -2780,16 +2784,16 @@
           <a:cs typeface="+mn-cs"/>
         </a:defRPr>
       </a:lvl5pPr>
-      <a:lvl6pPr marL="2514600" indent="-228600" algn="l" defTabSz="914400" rtl="0" eaLnBrk="1" latinLnBrk="0" hangingPunct="1">
+      <a:lvl6pPr marL="1173564" indent="-106688" algn="l" defTabSz="426750" rtl="0" eaLnBrk="1" latinLnBrk="0" hangingPunct="1">
         <a:lnSpc>
           <a:spcPct val="90000"/>
         </a:lnSpc>
         <a:spcBef>
-          <a:spcPts val="500"/>
+          <a:spcPts val="233"/>
         </a:spcBef>
         <a:buFont typeface="Arial" panose="020B0604020202020204" pitchFamily="34" charset="0"/>
         <a:buChar char="•"/>
-        <a:defRPr sz="1800" kern="1200">
+        <a:defRPr sz="840" kern="1200">
           <a:solidFill>
             <a:schemeClr val="tx1"/>
           </a:solidFill>
@@ -2798,16 +2802,16 @@
           <a:cs typeface="+mn-cs"/>
         </a:defRPr>
       </a:lvl6pPr>
-      <a:lvl7pPr marL="2971800" indent="-228600" algn="l" defTabSz="914400" rtl="0" eaLnBrk="1" latinLnBrk="0" hangingPunct="1">
+      <a:lvl7pPr marL="1386939" indent="-106688" algn="l" defTabSz="426750" rtl="0" eaLnBrk="1" latinLnBrk="0" hangingPunct="1">
         <a:lnSpc>
           <a:spcPct val="90000"/>
         </a:lnSpc>
         <a:spcBef>
-          <a:spcPts val="500"/>
+          <a:spcPts val="233"/>
         </a:spcBef>
         <a:buFont typeface="Arial" panose="020B0604020202020204" pitchFamily="34" charset="0"/>
         <a:buChar char="•"/>
-        <a:defRPr sz="1800" kern="1200">
+        <a:defRPr sz="840" kern="1200">
           <a:solidFill>
             <a:schemeClr val="tx1"/>
           </a:solidFill>
@@ -2816,16 +2820,16 @@
           <a:cs typeface="+mn-cs"/>
         </a:defRPr>
       </a:lvl7pPr>
-      <a:lvl8pPr marL="3429000" indent="-228600" algn="l" defTabSz="914400" rtl="0" eaLnBrk="1" latinLnBrk="0" hangingPunct="1">
+      <a:lvl8pPr marL="1600314" indent="-106688" algn="l" defTabSz="426750" rtl="0" eaLnBrk="1" latinLnBrk="0" hangingPunct="1">
         <a:lnSpc>
           <a:spcPct val="90000"/>
         </a:lnSpc>
         <a:spcBef>
-          <a:spcPts val="500"/>
+          <a:spcPts val="233"/>
         </a:spcBef>
         <a:buFont typeface="Arial" panose="020B0604020202020204" pitchFamily="34" charset="0"/>
         <a:buChar char="•"/>
-        <a:defRPr sz="1800" kern="1200">
+        <a:defRPr sz="840" kern="1200">
           <a:solidFill>
             <a:schemeClr val="tx1"/>
           </a:solidFill>
@@ -2834,16 +2838,16 @@
           <a:cs typeface="+mn-cs"/>
         </a:defRPr>
       </a:lvl8pPr>
-      <a:lvl9pPr marL="3886200" indent="-228600" algn="l" defTabSz="914400" rtl="0" eaLnBrk="1" latinLnBrk="0" hangingPunct="1">
+      <a:lvl9pPr marL="1813690" indent="-106688" algn="l" defTabSz="426750" rtl="0" eaLnBrk="1" latinLnBrk="0" hangingPunct="1">
         <a:lnSpc>
           <a:spcPct val="90000"/>
         </a:lnSpc>
         <a:spcBef>
-          <a:spcPts val="500"/>
+          <a:spcPts val="233"/>
         </a:spcBef>
         <a:buFont typeface="Arial" panose="020B0604020202020204" pitchFamily="34" charset="0"/>
         <a:buChar char="•"/>
-        <a:defRPr sz="1800" kern="1200">
+        <a:defRPr sz="840" kern="1200">
           <a:solidFill>
             <a:schemeClr val="tx1"/>
           </a:solidFill>
@@ -2855,10 +2859,10 @@
     </p:bodyStyle>
     <p:otherStyle>
       <a:defPPr>
-        <a:defRPr lang="de-DE"/>
+        <a:defRPr lang="en-US"/>
       </a:defPPr>
-      <a:lvl1pPr marL="0" algn="l" defTabSz="914400" rtl="0" eaLnBrk="1" latinLnBrk="0" hangingPunct="1">
-        <a:defRPr sz="1800" kern="1200">
+      <a:lvl1pPr marL="0" algn="l" defTabSz="426750" rtl="0" eaLnBrk="1" latinLnBrk="0" hangingPunct="1">
+        <a:defRPr sz="840" kern="1200">
           <a:solidFill>
             <a:schemeClr val="tx1"/>
           </a:solidFill>
@@ -2867,8 +2871,8 @@
           <a:cs typeface="+mn-cs"/>
         </a:defRPr>
       </a:lvl1pPr>
-      <a:lvl2pPr marL="457200" algn="l" defTabSz="914400" rtl="0" eaLnBrk="1" latinLnBrk="0" hangingPunct="1">
-        <a:defRPr sz="1800" kern="1200">
+      <a:lvl2pPr marL="213375" algn="l" defTabSz="426750" rtl="0" eaLnBrk="1" latinLnBrk="0" hangingPunct="1">
+        <a:defRPr sz="840" kern="1200">
           <a:solidFill>
             <a:schemeClr val="tx1"/>
           </a:solidFill>
@@ -2877,8 +2881,8 @@
           <a:cs typeface="+mn-cs"/>
         </a:defRPr>
       </a:lvl2pPr>
-      <a:lvl3pPr marL="914400" algn="l" defTabSz="914400" rtl="0" eaLnBrk="1" latinLnBrk="0" hangingPunct="1">
-        <a:defRPr sz="1800" kern="1200">
+      <a:lvl3pPr marL="426750" algn="l" defTabSz="426750" rtl="0" eaLnBrk="1" latinLnBrk="0" hangingPunct="1">
+        <a:defRPr sz="840" kern="1200">
           <a:solidFill>
             <a:schemeClr val="tx1"/>
           </a:solidFill>
@@ -2887,8 +2891,8 @@
           <a:cs typeface="+mn-cs"/>
         </a:defRPr>
       </a:lvl3pPr>
-      <a:lvl4pPr marL="1371600" algn="l" defTabSz="914400" rtl="0" eaLnBrk="1" latinLnBrk="0" hangingPunct="1">
-        <a:defRPr sz="1800" kern="1200">
+      <a:lvl4pPr marL="640126" algn="l" defTabSz="426750" rtl="0" eaLnBrk="1" latinLnBrk="0" hangingPunct="1">
+        <a:defRPr sz="840" kern="1200">
           <a:solidFill>
             <a:schemeClr val="tx1"/>
           </a:solidFill>
@@ -2897,8 +2901,8 @@
           <a:cs typeface="+mn-cs"/>
         </a:defRPr>
       </a:lvl4pPr>
-      <a:lvl5pPr marL="1828800" algn="l" defTabSz="914400" rtl="0" eaLnBrk="1" latinLnBrk="0" hangingPunct="1">
-        <a:defRPr sz="1800" kern="1200">
+      <a:lvl5pPr marL="853501" algn="l" defTabSz="426750" rtl="0" eaLnBrk="1" latinLnBrk="0" hangingPunct="1">
+        <a:defRPr sz="840" kern="1200">
           <a:solidFill>
             <a:schemeClr val="tx1"/>
           </a:solidFill>
@@ -2907,8 +2911,8 @@
           <a:cs typeface="+mn-cs"/>
         </a:defRPr>
       </a:lvl5pPr>
-      <a:lvl6pPr marL="2286000" algn="l" defTabSz="914400" rtl="0" eaLnBrk="1" latinLnBrk="0" hangingPunct="1">
-        <a:defRPr sz="1800" kern="1200">
+      <a:lvl6pPr marL="1066876" algn="l" defTabSz="426750" rtl="0" eaLnBrk="1" latinLnBrk="0" hangingPunct="1">
+        <a:defRPr sz="840" kern="1200">
           <a:solidFill>
             <a:schemeClr val="tx1"/>
           </a:solidFill>
@@ -2917,8 +2921,8 @@
           <a:cs typeface="+mn-cs"/>
         </a:defRPr>
       </a:lvl6pPr>
-      <a:lvl7pPr marL="2743200" algn="l" defTabSz="914400" rtl="0" eaLnBrk="1" latinLnBrk="0" hangingPunct="1">
-        <a:defRPr sz="1800" kern="1200">
+      <a:lvl7pPr marL="1280251" algn="l" defTabSz="426750" rtl="0" eaLnBrk="1" latinLnBrk="0" hangingPunct="1">
+        <a:defRPr sz="840" kern="1200">
           <a:solidFill>
             <a:schemeClr val="tx1"/>
           </a:solidFill>
@@ -2927,8 +2931,8 @@
           <a:cs typeface="+mn-cs"/>
         </a:defRPr>
       </a:lvl7pPr>
-      <a:lvl8pPr marL="3200400" algn="l" defTabSz="914400" rtl="0" eaLnBrk="1" latinLnBrk="0" hangingPunct="1">
-        <a:defRPr sz="1800" kern="1200">
+      <a:lvl8pPr marL="1493627" algn="l" defTabSz="426750" rtl="0" eaLnBrk="1" latinLnBrk="0" hangingPunct="1">
+        <a:defRPr sz="840" kern="1200">
           <a:solidFill>
             <a:schemeClr val="tx1"/>
           </a:solidFill>
@@ -2937,8 +2941,8 @@
           <a:cs typeface="+mn-cs"/>
         </a:defRPr>
       </a:lvl8pPr>
-      <a:lvl9pPr marL="3657600" algn="l" defTabSz="914400" rtl="0" eaLnBrk="1" latinLnBrk="0" hangingPunct="1">
-        <a:defRPr sz="1800" kern="1200">
+      <a:lvl9pPr marL="1707002" algn="l" defTabSz="426750" rtl="0" eaLnBrk="1" latinLnBrk="0" hangingPunct="1">
+        <a:defRPr sz="840" kern="1200">
           <a:solidFill>
             <a:schemeClr val="tx1"/>
           </a:solidFill>
@@ -2969,42 +2973,6 @@
           <a:chExt cx="0" cy="0"/>
         </a:xfrm>
       </p:grpSpPr>
-      <p:cxnSp>
-        <p:nvCxnSpPr>
-          <p:cNvPr id="6" name="Straight Arrow Connector 5"/>
-          <p:cNvCxnSpPr/>
-          <p:nvPr/>
-        </p:nvCxnSpPr>
-        <p:spPr>
-          <a:xfrm flipH="1">
-            <a:off x="7072605" y="1449356"/>
-            <a:ext cx="503853" cy="0"/>
-          </a:xfrm>
-          <a:prstGeom prst="straightConnector1">
-            <a:avLst/>
-          </a:prstGeom>
-          <a:ln w="28575">
-            <a:solidFill>
-              <a:srgbClr val="FF0000"/>
-            </a:solidFill>
-            <a:tailEnd type="triangle"/>
-          </a:ln>
-        </p:spPr>
-        <p:style>
-          <a:lnRef idx="1">
-            <a:schemeClr val="accent1"/>
-          </a:lnRef>
-          <a:fillRef idx="0">
-            <a:schemeClr val="accent1"/>
-          </a:fillRef>
-          <a:effectRef idx="0">
-            <a:schemeClr val="accent1"/>
-          </a:effectRef>
-          <a:fontRef idx="minor">
-            <a:schemeClr val="tx1"/>
-          </a:fontRef>
-        </p:style>
-      </p:cxnSp>
       <p:pic>
         <p:nvPicPr>
           <p:cNvPr id="5" name="Picture 4"/>
@@ -3021,8 +2989,8 @@
         </p:blipFill>
         <p:spPr>
           <a:xfrm>
-            <a:off x="0" y="0"/>
-            <a:ext cx="12117286" cy="2270449"/>
+            <a:off x="0" y="438151"/>
+            <a:ext cx="12192000" cy="2284448"/>
           </a:xfrm>
           <a:prstGeom prst="rect">
             <a:avLst/>
@@ -3045,7 +3013,7 @@
 <file path=ppt/theme/theme1.xml><?xml version="1.0" encoding="utf-8"?>
 <a:theme xmlns:a="http://schemas.openxmlformats.org/drawingml/2006/main" name="Office Theme">
   <a:themeElements>
-    <a:clrScheme name="Office">
+    <a:clrScheme name="Office Theme">
       <a:dk1>
         <a:sysClr val="windowText" lastClr="000000"/>
       </a:dk1>
@@ -3083,7 +3051,7 @@
         <a:srgbClr val="954F72"/>
       </a:folHlink>
     </a:clrScheme>
-    <a:fontScheme name="Office">
+    <a:fontScheme name="Office Theme">
       <a:majorFont>
         <a:latin typeface="Calibri Light" panose="020F0302020204030204"/>
         <a:ea typeface=""/>
@@ -3155,7 +3123,7 @@
         <a:font script="Geor" typeface="Sylfaen"/>
       </a:minorFont>
     </a:fontScheme>
-    <a:fmtScheme name="Office">
+    <a:fmtScheme name="Office Theme">
       <a:fillStyleLst>
         <a:solidFill>
           <a:schemeClr val="phClr"/>

</xml_diff>